<commit_message>
Updated presentation- Added brute force and the intro for the app we hacked.
</commit_message>
<xml_diff>
--- a/Documentation/Final Presentation SePr.pptx
+++ b/Documentation/Final Presentation SePr.pptx
@@ -5,7 +5,7 @@
     <p:sldMasterId id="2147483696" r:id="rId1"/>
   </p:sldMasterIdLst>
   <p:notesMasterIdLst>
-    <p:notesMasterId r:id="rId15"/>
+    <p:notesMasterId r:id="rId19"/>
   </p:notesMasterIdLst>
   <p:sldIdLst>
     <p:sldId id="256" r:id="rId2"/>
@@ -14,13 +14,17 @@
     <p:sldId id="263" r:id="rId5"/>
     <p:sldId id="264" r:id="rId6"/>
     <p:sldId id="271" r:id="rId7"/>
-    <p:sldId id="265" r:id="rId8"/>
-    <p:sldId id="266" r:id="rId9"/>
-    <p:sldId id="267" r:id="rId10"/>
-    <p:sldId id="268" r:id="rId11"/>
-    <p:sldId id="269" r:id="rId12"/>
-    <p:sldId id="270" r:id="rId13"/>
-    <p:sldId id="272" r:id="rId14"/>
+    <p:sldId id="275" r:id="rId8"/>
+    <p:sldId id="265" r:id="rId9"/>
+    <p:sldId id="266" r:id="rId10"/>
+    <p:sldId id="276" r:id="rId11"/>
+    <p:sldId id="267" r:id="rId12"/>
+    <p:sldId id="268" r:id="rId13"/>
+    <p:sldId id="274" r:id="rId14"/>
+    <p:sldId id="269" r:id="rId15"/>
+    <p:sldId id="270" r:id="rId16"/>
+    <p:sldId id="273" r:id="rId17"/>
+    <p:sldId id="272" r:id="rId18"/>
   </p:sldIdLst>
   <p:sldSz cx="12192000" cy="6858000"/>
   <p:notesSz cx="6858000" cy="9144000"/>
@@ -209,7 +213,7 @@
           <a:p>
             <a:fld id="{AE520918-36F4-4479-BBDA-BA11C520E204}" type="datetimeFigureOut">
               <a:rPr lang="en-US" smtClean="0"/>
-              <a:t>10/19/2016</a:t>
+              <a:t>10/20/2016</a:t>
             </a:fld>
             <a:endParaRPr lang="en-US"/>
           </a:p>
@@ -625,7 +629,259 @@
           <a:p>
             <a:fld id="{53E6C0B4-FA9C-42C0-A6E5-06851424880F}" type="slidenum">
               <a:rPr lang="en-US" smtClean="0"/>
+              <a:t>11</a:t>
+            </a:fld>
+            <a:endParaRPr lang="en-US"/>
+          </a:p>
+        </p:txBody>
+      </p:sp>
+    </p:spTree>
+    <p:extLst>
+      <p:ext uri="{BB962C8B-B14F-4D97-AF65-F5344CB8AC3E}">
+        <p14:creationId xmlns:p14="http://schemas.microsoft.com/office/powerpoint/2010/main" val="1556013515"/>
+      </p:ext>
+    </p:extLst>
+  </p:cSld>
+  <p:clrMapOvr>
+    <a:masterClrMapping/>
+  </p:clrMapOvr>
+</p:notes>
+</file>
+
+<file path=ppt/notesSlides/notesSlide11.xml><?xml version="1.0" encoding="utf-8"?>
+<p:notes xmlns:a="http://schemas.openxmlformats.org/drawingml/2006/main" xmlns:r="http://schemas.openxmlformats.org/officeDocument/2006/relationships" xmlns:p="http://schemas.openxmlformats.org/presentationml/2006/main">
+  <p:cSld>
+    <p:spTree>
+      <p:nvGrpSpPr>
+        <p:cNvPr id="1" name=""/>
+        <p:cNvGrpSpPr/>
+        <p:nvPr/>
+      </p:nvGrpSpPr>
+      <p:grpSpPr>
+        <a:xfrm>
+          <a:off x="0" y="0"/>
+          <a:ext cx="0" cy="0"/>
+          <a:chOff x="0" y="0"/>
+          <a:chExt cx="0" cy="0"/>
+        </a:xfrm>
+      </p:grpSpPr>
+      <p:sp>
+        <p:nvSpPr>
+          <p:cNvPr id="2" name="Slide Image Placeholder 1"/>
+          <p:cNvSpPr>
+            <a:spLocks noGrp="1" noRot="1" noChangeAspect="1"/>
+          </p:cNvSpPr>
+          <p:nvPr>
+            <p:ph type="sldImg"/>
+          </p:nvPr>
+        </p:nvSpPr>
+        <p:spPr/>
+      </p:sp>
+      <p:sp>
+        <p:nvSpPr>
+          <p:cNvPr id="3" name="Notes Placeholder 2"/>
+          <p:cNvSpPr>
+            <a:spLocks noGrp="1"/>
+          </p:cNvSpPr>
+          <p:nvPr>
+            <p:ph type="body" idx="1"/>
+          </p:nvPr>
+        </p:nvSpPr>
+        <p:spPr/>
+        <p:txBody>
+          <a:bodyPr/>
+          <a:lstStyle/>
+          <a:p>
+            <a:endParaRPr lang="en-US" dirty="0"/>
+          </a:p>
+        </p:txBody>
+      </p:sp>
+      <p:sp>
+        <p:nvSpPr>
+          <p:cNvPr id="4" name="Slide Number Placeholder 3"/>
+          <p:cNvSpPr>
+            <a:spLocks noGrp="1"/>
+          </p:cNvSpPr>
+          <p:nvPr>
+            <p:ph type="sldNum" sz="quarter" idx="10"/>
+          </p:nvPr>
+        </p:nvSpPr>
+        <p:spPr/>
+        <p:txBody>
+          <a:bodyPr/>
+          <a:lstStyle/>
+          <a:p>
+            <a:fld id="{53E6C0B4-FA9C-42C0-A6E5-06851424880F}" type="slidenum">
+              <a:rPr lang="en-US" smtClean="0"/>
               <a:t>13</a:t>
+            </a:fld>
+            <a:endParaRPr lang="en-US"/>
+          </a:p>
+        </p:txBody>
+      </p:sp>
+    </p:spTree>
+    <p:extLst>
+      <p:ext uri="{BB962C8B-B14F-4D97-AF65-F5344CB8AC3E}">
+        <p14:creationId xmlns:p14="http://schemas.microsoft.com/office/powerpoint/2010/main" val="361091613"/>
+      </p:ext>
+    </p:extLst>
+  </p:cSld>
+  <p:clrMapOvr>
+    <a:masterClrMapping/>
+  </p:clrMapOvr>
+</p:notes>
+</file>
+
+<file path=ppt/notesSlides/notesSlide12.xml><?xml version="1.0" encoding="utf-8"?>
+<p:notes xmlns:a="http://schemas.openxmlformats.org/drawingml/2006/main" xmlns:r="http://schemas.openxmlformats.org/officeDocument/2006/relationships" xmlns:p="http://schemas.openxmlformats.org/presentationml/2006/main">
+  <p:cSld>
+    <p:spTree>
+      <p:nvGrpSpPr>
+        <p:cNvPr id="1" name=""/>
+        <p:cNvGrpSpPr/>
+        <p:nvPr/>
+      </p:nvGrpSpPr>
+      <p:grpSpPr>
+        <a:xfrm>
+          <a:off x="0" y="0"/>
+          <a:ext cx="0" cy="0"/>
+          <a:chOff x="0" y="0"/>
+          <a:chExt cx="0" cy="0"/>
+        </a:xfrm>
+      </p:grpSpPr>
+      <p:sp>
+        <p:nvSpPr>
+          <p:cNvPr id="2" name="Slide Image Placeholder 1"/>
+          <p:cNvSpPr>
+            <a:spLocks noGrp="1" noRot="1" noChangeAspect="1"/>
+          </p:cNvSpPr>
+          <p:nvPr>
+            <p:ph type="sldImg"/>
+          </p:nvPr>
+        </p:nvSpPr>
+        <p:spPr/>
+      </p:sp>
+      <p:sp>
+        <p:nvSpPr>
+          <p:cNvPr id="3" name="Notes Placeholder 2"/>
+          <p:cNvSpPr>
+            <a:spLocks noGrp="1"/>
+          </p:cNvSpPr>
+          <p:nvPr>
+            <p:ph type="body" idx="1"/>
+          </p:nvPr>
+        </p:nvSpPr>
+        <p:spPr/>
+        <p:txBody>
+          <a:bodyPr/>
+          <a:lstStyle/>
+          <a:p>
+            <a:endParaRPr lang="en-US" dirty="0"/>
+          </a:p>
+        </p:txBody>
+      </p:sp>
+      <p:sp>
+        <p:nvSpPr>
+          <p:cNvPr id="4" name="Slide Number Placeholder 3"/>
+          <p:cNvSpPr>
+            <a:spLocks noGrp="1"/>
+          </p:cNvSpPr>
+          <p:nvPr>
+            <p:ph type="sldNum" sz="quarter" idx="10"/>
+          </p:nvPr>
+        </p:nvSpPr>
+        <p:spPr/>
+        <p:txBody>
+          <a:bodyPr/>
+          <a:lstStyle/>
+          <a:p>
+            <a:fld id="{53E6C0B4-FA9C-42C0-A6E5-06851424880F}" type="slidenum">
+              <a:rPr lang="en-US" smtClean="0"/>
+              <a:t>14</a:t>
+            </a:fld>
+            <a:endParaRPr lang="en-US"/>
+          </a:p>
+        </p:txBody>
+      </p:sp>
+    </p:spTree>
+    <p:extLst>
+      <p:ext uri="{BB962C8B-B14F-4D97-AF65-F5344CB8AC3E}">
+        <p14:creationId xmlns:p14="http://schemas.microsoft.com/office/powerpoint/2010/main" val="3402271359"/>
+      </p:ext>
+    </p:extLst>
+  </p:cSld>
+  <p:clrMapOvr>
+    <a:masterClrMapping/>
+  </p:clrMapOvr>
+</p:notes>
+</file>
+
+<file path=ppt/notesSlides/notesSlide13.xml><?xml version="1.0" encoding="utf-8"?>
+<p:notes xmlns:a="http://schemas.openxmlformats.org/drawingml/2006/main" xmlns:r="http://schemas.openxmlformats.org/officeDocument/2006/relationships" xmlns:p="http://schemas.openxmlformats.org/presentationml/2006/main">
+  <p:cSld>
+    <p:spTree>
+      <p:nvGrpSpPr>
+        <p:cNvPr id="1" name=""/>
+        <p:cNvGrpSpPr/>
+        <p:nvPr/>
+      </p:nvGrpSpPr>
+      <p:grpSpPr>
+        <a:xfrm>
+          <a:off x="0" y="0"/>
+          <a:ext cx="0" cy="0"/>
+          <a:chOff x="0" y="0"/>
+          <a:chExt cx="0" cy="0"/>
+        </a:xfrm>
+      </p:grpSpPr>
+      <p:sp>
+        <p:nvSpPr>
+          <p:cNvPr id="2" name="Slide Image Placeholder 1"/>
+          <p:cNvSpPr>
+            <a:spLocks noGrp="1" noRot="1" noChangeAspect="1"/>
+          </p:cNvSpPr>
+          <p:nvPr>
+            <p:ph type="sldImg"/>
+          </p:nvPr>
+        </p:nvSpPr>
+        <p:spPr/>
+      </p:sp>
+      <p:sp>
+        <p:nvSpPr>
+          <p:cNvPr id="3" name="Notes Placeholder 2"/>
+          <p:cNvSpPr>
+            <a:spLocks noGrp="1"/>
+          </p:cNvSpPr>
+          <p:nvPr>
+            <p:ph type="body" idx="1"/>
+          </p:nvPr>
+        </p:nvSpPr>
+        <p:spPr/>
+        <p:txBody>
+          <a:bodyPr/>
+          <a:lstStyle/>
+          <a:p>
+            <a:endParaRPr lang="en-US" dirty="0"/>
+          </a:p>
+        </p:txBody>
+      </p:sp>
+      <p:sp>
+        <p:nvSpPr>
+          <p:cNvPr id="4" name="Slide Number Placeholder 3"/>
+          <p:cNvSpPr>
+            <a:spLocks noGrp="1"/>
+          </p:cNvSpPr>
+          <p:nvPr>
+            <p:ph type="sldNum" sz="quarter" idx="10"/>
+          </p:nvPr>
+        </p:nvSpPr>
+        <p:spPr/>
+        <p:txBody>
+          <a:bodyPr/>
+          <a:lstStyle/>
+          <a:p>
+            <a:fld id="{53E6C0B4-FA9C-42C0-A6E5-06851424880F}" type="slidenum">
+              <a:rPr lang="en-US" smtClean="0"/>
+              <a:t>17</a:t>
             </a:fld>
             <a:endParaRPr lang="en-US"/>
           </a:p>
@@ -1170,7 +1426,7 @@
     </p:spTree>
     <p:extLst>
       <p:ext uri="{BB962C8B-B14F-4D97-AF65-F5344CB8AC3E}">
-        <p14:creationId xmlns:p14="http://schemas.microsoft.com/office/powerpoint/2010/main" val="800817665"/>
+        <p14:creationId xmlns:p14="http://schemas.microsoft.com/office/powerpoint/2010/main" val="1252204840"/>
       </p:ext>
     </p:extLst>
   </p:cSld>
@@ -1245,7 +1501,7 @@
           <a:p>
             <a:fld id="{53E6C0B4-FA9C-42C0-A6E5-06851424880F}" type="slidenum">
               <a:rPr lang="en-US" smtClean="0"/>
-              <a:t>9</a:t>
+              <a:t>8</a:t>
             </a:fld>
             <a:endParaRPr lang="en-US"/>
           </a:p>
@@ -1254,7 +1510,7 @@
     </p:spTree>
     <p:extLst>
       <p:ext uri="{BB962C8B-B14F-4D97-AF65-F5344CB8AC3E}">
-        <p14:creationId xmlns:p14="http://schemas.microsoft.com/office/powerpoint/2010/main" val="1556013515"/>
+        <p14:creationId xmlns:p14="http://schemas.microsoft.com/office/powerpoint/2010/main" val="800817665"/>
       </p:ext>
     </p:extLst>
   </p:cSld>
@@ -1329,7 +1585,7 @@
           <a:p>
             <a:fld id="{53E6C0B4-FA9C-42C0-A6E5-06851424880F}" type="slidenum">
               <a:rPr lang="en-US" smtClean="0"/>
-              <a:t>11</a:t>
+              <a:t>10</a:t>
             </a:fld>
             <a:endParaRPr lang="en-US"/>
           </a:p>
@@ -1338,7 +1594,7 @@
     </p:spTree>
     <p:extLst>
       <p:ext uri="{BB962C8B-B14F-4D97-AF65-F5344CB8AC3E}">
-        <p14:creationId xmlns:p14="http://schemas.microsoft.com/office/powerpoint/2010/main" val="3402271359"/>
+        <p14:creationId xmlns:p14="http://schemas.microsoft.com/office/powerpoint/2010/main" val="2152570738"/>
       </p:ext>
     </p:extLst>
   </p:cSld>
@@ -1495,7 +1751,7 @@
           <a:p>
             <a:fld id="{A3ACB364-332F-4470-A4B1-831322ECCE5D}" type="datetimeFigureOut">
               <a:rPr lang="en-US" smtClean="0"/>
-              <a:t>10/19/2016</a:t>
+              <a:t>10/20/2016</a:t>
             </a:fld>
             <a:endParaRPr lang="en-US"/>
           </a:p>
@@ -1665,7 +1921,7 @@
           <a:p>
             <a:fld id="{A3ACB364-332F-4470-A4B1-831322ECCE5D}" type="datetimeFigureOut">
               <a:rPr lang="en-US" smtClean="0"/>
-              <a:t>10/19/2016</a:t>
+              <a:t>10/20/2016</a:t>
             </a:fld>
             <a:endParaRPr lang="en-US"/>
           </a:p>
@@ -1845,7 +2101,7 @@
           <a:p>
             <a:fld id="{A3ACB364-332F-4470-A4B1-831322ECCE5D}" type="datetimeFigureOut">
               <a:rPr lang="en-US" smtClean="0"/>
-              <a:t>10/19/2016</a:t>
+              <a:t>10/20/2016</a:t>
             </a:fld>
             <a:endParaRPr lang="en-US"/>
           </a:p>
@@ -2015,7 +2271,7 @@
           <a:p>
             <a:fld id="{A3ACB364-332F-4470-A4B1-831322ECCE5D}" type="datetimeFigureOut">
               <a:rPr lang="en-US" smtClean="0"/>
-              <a:t>10/19/2016</a:t>
+              <a:t>10/20/2016</a:t>
             </a:fld>
             <a:endParaRPr lang="en-US"/>
           </a:p>
@@ -2271,7 +2527,7 @@
           <a:p>
             <a:fld id="{A3ACB364-332F-4470-A4B1-831322ECCE5D}" type="datetimeFigureOut">
               <a:rPr lang="en-US" smtClean="0"/>
-              <a:t>10/19/2016</a:t>
+              <a:t>10/20/2016</a:t>
             </a:fld>
             <a:endParaRPr lang="en-US"/>
           </a:p>
@@ -2559,7 +2815,7 @@
           <a:p>
             <a:fld id="{A3ACB364-332F-4470-A4B1-831322ECCE5D}" type="datetimeFigureOut">
               <a:rPr lang="en-US" smtClean="0"/>
-              <a:t>10/19/2016</a:t>
+              <a:t>10/20/2016</a:t>
             </a:fld>
             <a:endParaRPr lang="en-US"/>
           </a:p>
@@ -2988,7 +3244,7 @@
           <a:p>
             <a:fld id="{A3ACB364-332F-4470-A4B1-831322ECCE5D}" type="datetimeFigureOut">
               <a:rPr lang="en-US" smtClean="0"/>
-              <a:t>10/19/2016</a:t>
+              <a:t>10/20/2016</a:t>
             </a:fld>
             <a:endParaRPr lang="en-US"/>
           </a:p>
@@ -3106,7 +3362,7 @@
           <a:p>
             <a:fld id="{A3ACB364-332F-4470-A4B1-831322ECCE5D}" type="datetimeFigureOut">
               <a:rPr lang="en-US" smtClean="0"/>
-              <a:t>10/19/2016</a:t>
+              <a:t>10/20/2016</a:t>
             </a:fld>
             <a:endParaRPr lang="en-US"/>
           </a:p>
@@ -3201,7 +3457,7 @@
           <a:p>
             <a:fld id="{A3ACB364-332F-4470-A4B1-831322ECCE5D}" type="datetimeFigureOut">
               <a:rPr lang="en-US" smtClean="0"/>
-              <a:t>10/19/2016</a:t>
+              <a:t>10/20/2016</a:t>
             </a:fld>
             <a:endParaRPr lang="en-US"/>
           </a:p>
@@ -3557,7 +3813,7 @@
           <a:p>
             <a:fld id="{A3ACB364-332F-4470-A4B1-831322ECCE5D}" type="datetimeFigureOut">
               <a:rPr lang="en-US" smtClean="0"/>
-              <a:t>10/19/2016</a:t>
+              <a:t>10/20/2016</a:t>
             </a:fld>
             <a:endParaRPr lang="en-US"/>
           </a:p>
@@ -3852,7 +4108,7 @@
           <a:p>
             <a:fld id="{A3ACB364-332F-4470-A4B1-831322ECCE5D}" type="datetimeFigureOut">
               <a:rPr lang="en-US" smtClean="0"/>
-              <a:t>10/19/2016</a:t>
+              <a:t>10/20/2016</a:t>
             </a:fld>
             <a:endParaRPr lang="en-US"/>
           </a:p>
@@ -4070,7 +4326,7 @@
           <a:p>
             <a:fld id="{A3ACB364-332F-4470-A4B1-831322ECCE5D}" type="datetimeFigureOut">
               <a:rPr lang="en-US" smtClean="0"/>
-              <a:t>10/19/2016</a:t>
+              <a:t>10/20/2016</a:t>
             </a:fld>
             <a:endParaRPr lang="en-US"/>
           </a:p>
@@ -4654,6 +4910,167 @@
           <a:chExt cx="0" cy="0"/>
         </a:xfrm>
       </p:grpSpPr>
+      <p:pic>
+        <p:nvPicPr>
+          <p:cNvPr id="4" name="Picture 3"/>
+          <p:cNvPicPr>
+            <a:picLocks noChangeAspect="1"/>
+          </p:cNvPicPr>
+          <p:nvPr/>
+        </p:nvPicPr>
+        <p:blipFill>
+          <a:blip r:embed="rId3">
+            <a:extLst>
+              <a:ext uri="{28A0092B-C50C-407E-A947-70E740481C1C}">
+                <a14:useLocalDpi xmlns:a14="http://schemas.microsoft.com/office/drawing/2010/main" val="0"/>
+              </a:ext>
+            </a:extLst>
+          </a:blip>
+          <a:stretch>
+            <a:fillRect/>
+          </a:stretch>
+        </p:blipFill>
+        <p:spPr>
+          <a:xfrm>
+            <a:off x="0" y="-1"/>
+            <a:ext cx="12192000" cy="7221071"/>
+          </a:xfrm>
+          <a:prstGeom prst="rect">
+            <a:avLst/>
+          </a:prstGeom>
+        </p:spPr>
+      </p:pic>
+    </p:spTree>
+    <p:extLst>
+      <p:ext uri="{BB962C8B-B14F-4D97-AF65-F5344CB8AC3E}">
+        <p14:creationId xmlns:p14="http://schemas.microsoft.com/office/powerpoint/2010/main" val="2159257500"/>
+      </p:ext>
+    </p:extLst>
+  </p:cSld>
+  <p:clrMapOvr>
+    <a:masterClrMapping/>
+  </p:clrMapOvr>
+</p:sld>
+</file>
+
+<file path=ppt/slides/slide11.xml><?xml version="1.0" encoding="utf-8"?>
+<p:sld xmlns:a="http://schemas.openxmlformats.org/drawingml/2006/main" xmlns:r="http://schemas.openxmlformats.org/officeDocument/2006/relationships" xmlns:p="http://schemas.openxmlformats.org/presentationml/2006/main">
+  <p:cSld>
+    <p:spTree>
+      <p:nvGrpSpPr>
+        <p:cNvPr id="1" name=""/>
+        <p:cNvGrpSpPr/>
+        <p:nvPr/>
+      </p:nvGrpSpPr>
+      <p:grpSpPr>
+        <a:xfrm>
+          <a:off x="0" y="0"/>
+          <a:ext cx="0" cy="0"/>
+          <a:chOff x="0" y="0"/>
+          <a:chExt cx="0" cy="0"/>
+        </a:xfrm>
+      </p:grpSpPr>
+      <p:sp>
+        <p:nvSpPr>
+          <p:cNvPr id="2" name="Title 1"/>
+          <p:cNvSpPr>
+            <a:spLocks noGrp="1"/>
+          </p:cNvSpPr>
+          <p:nvPr>
+            <p:ph type="ctrTitle"/>
+          </p:nvPr>
+        </p:nvSpPr>
+        <p:spPr>
+          <a:xfrm>
+            <a:off x="603504" y="4116227"/>
+            <a:ext cx="10782300" cy="1336524"/>
+          </a:xfrm>
+        </p:spPr>
+        <p:txBody>
+          <a:bodyPr/>
+          <a:lstStyle/>
+          <a:p>
+            <a:pPr algn="r"/>
+            <a:r>
+              <a:rPr lang="en-US" sz="7200" dirty="0">
+                <a:latin typeface="Open sans" panose="020B0606030504020204" pitchFamily="34" charset="0"/>
+                <a:ea typeface="Open sans" panose="020B0606030504020204" pitchFamily="34" charset="0"/>
+                <a:cs typeface="Open sans" panose="020B0606030504020204" pitchFamily="34" charset="0"/>
+              </a:rPr>
+              <a:t>XSS Vulnerability</a:t>
+            </a:r>
+            <a:endParaRPr lang="en-US" sz="6600" dirty="0"/>
+          </a:p>
+        </p:txBody>
+      </p:sp>
+      <p:sp>
+        <p:nvSpPr>
+          <p:cNvPr id="3" name="Subtitle 2"/>
+          <p:cNvSpPr>
+            <a:spLocks noGrp="1"/>
+          </p:cNvSpPr>
+          <p:nvPr>
+            <p:ph type="subTitle" idx="1"/>
+          </p:nvPr>
+        </p:nvSpPr>
+        <p:spPr>
+          <a:xfrm>
+            <a:off x="799447" y="2148114"/>
+            <a:ext cx="10353235" cy="1968113"/>
+          </a:xfrm>
+        </p:spPr>
+        <p:txBody>
+          <a:bodyPr>
+            <a:normAutofit/>
+          </a:bodyPr>
+          <a:lstStyle/>
+          <a:p>
+            <a:pPr>
+              <a:lnSpc>
+                <a:spcPct val="100000"/>
+              </a:lnSpc>
+              <a:spcBef>
+                <a:spcPts val="0"/>
+              </a:spcBef>
+            </a:pPr>
+            <a:r>
+              <a:rPr lang="en-US" dirty="0"/>
+              <a:t>Web Browser XSS Protection is not enabled, or is disabled by the configuration of the 'X-XSS-Protection' HTTP response header on the web server</a:t>
+            </a:r>
+            <a:endParaRPr lang="en-US" b="1" dirty="0"/>
+          </a:p>
+        </p:txBody>
+      </p:sp>
+    </p:spTree>
+    <p:extLst>
+      <p:ext uri="{BB962C8B-B14F-4D97-AF65-F5344CB8AC3E}">
+        <p14:creationId xmlns:p14="http://schemas.microsoft.com/office/powerpoint/2010/main" val="767117228"/>
+      </p:ext>
+    </p:extLst>
+  </p:cSld>
+  <p:clrMapOvr>
+    <a:masterClrMapping/>
+  </p:clrMapOvr>
+</p:sld>
+</file>
+
+<file path=ppt/slides/slide12.xml><?xml version="1.0" encoding="utf-8"?>
+<p:sld xmlns:a="http://schemas.openxmlformats.org/drawingml/2006/main" xmlns:r="http://schemas.openxmlformats.org/officeDocument/2006/relationships" xmlns:p="http://schemas.openxmlformats.org/presentationml/2006/main">
+  <p:cSld>
+    <p:spTree>
+      <p:nvGrpSpPr>
+        <p:cNvPr id="1" name=""/>
+        <p:cNvGrpSpPr/>
+        <p:nvPr/>
+      </p:nvGrpSpPr>
+      <p:grpSpPr>
+        <a:xfrm>
+          <a:off x="0" y="0"/>
+          <a:ext cx="0" cy="0"/>
+          <a:chOff x="0" y="0"/>
+          <a:chExt cx="0" cy="0"/>
+        </a:xfrm>
+      </p:grpSpPr>
       <p:sp>
         <p:nvSpPr>
           <p:cNvPr id="2" name="Title 1"/>
@@ -4759,7 +5176,7 @@
 </p:sld>
 </file>
 
-<file path=ppt/slides/slide11.xml><?xml version="1.0" encoding="utf-8"?>
+<file path=ppt/slides/slide13.xml><?xml version="1.0" encoding="utf-8"?>
 <p:sld xmlns:a="http://schemas.openxmlformats.org/drawingml/2006/main" xmlns:r="http://schemas.openxmlformats.org/officeDocument/2006/relationships" xmlns:p="http://schemas.openxmlformats.org/presentationml/2006/main">
   <p:cSld>
     <p:spTree>
@@ -4798,6 +5215,107 @@
           <a:p>
             <a:pPr algn="r"/>
             <a:r>
+              <a:rPr lang="ro-RO" sz="7200" dirty="0">
+                <a:latin typeface="Open sans" panose="020B0606030504020204" pitchFamily="34" charset="0"/>
+                <a:ea typeface="Open sans" panose="020B0606030504020204" pitchFamily="34" charset="0"/>
+                <a:cs typeface="Open sans" panose="020B0606030504020204" pitchFamily="34" charset="0"/>
+              </a:rPr>
+              <a:t>Brute Force attack</a:t>
+            </a:r>
+            <a:endParaRPr lang="en-US" sz="6600" dirty="0"/>
+          </a:p>
+        </p:txBody>
+      </p:sp>
+      <p:sp>
+        <p:nvSpPr>
+          <p:cNvPr id="3" name="Subtitle 2"/>
+          <p:cNvSpPr>
+            <a:spLocks noGrp="1"/>
+          </p:cNvSpPr>
+          <p:nvPr>
+            <p:ph type="subTitle" idx="1"/>
+          </p:nvPr>
+        </p:nvSpPr>
+        <p:spPr>
+          <a:xfrm>
+            <a:off x="799447" y="2510971"/>
+            <a:ext cx="10353235" cy="1605256"/>
+          </a:xfrm>
+        </p:spPr>
+        <p:txBody>
+          <a:bodyPr>
+            <a:normAutofit/>
+          </a:bodyPr>
+          <a:lstStyle/>
+          <a:p>
+            <a:pPr>
+              <a:lnSpc>
+                <a:spcPct val="100000"/>
+              </a:lnSpc>
+              <a:spcBef>
+                <a:spcPts val="0"/>
+              </a:spcBef>
+            </a:pPr>
+            <a:r>
+              <a:rPr lang="ro-RO" dirty="0"/>
+              <a:t>Password length, No password encryption.</a:t>
+            </a:r>
+            <a:endParaRPr lang="en-US" b="1" dirty="0"/>
+          </a:p>
+        </p:txBody>
+      </p:sp>
+    </p:spTree>
+    <p:extLst>
+      <p:ext uri="{BB962C8B-B14F-4D97-AF65-F5344CB8AC3E}">
+        <p14:creationId xmlns:p14="http://schemas.microsoft.com/office/powerpoint/2010/main" val="2831362221"/>
+      </p:ext>
+    </p:extLst>
+  </p:cSld>
+  <p:clrMapOvr>
+    <a:masterClrMapping/>
+  </p:clrMapOvr>
+</p:sld>
+</file>
+
+<file path=ppt/slides/slide14.xml><?xml version="1.0" encoding="utf-8"?>
+<p:sld xmlns:a="http://schemas.openxmlformats.org/drawingml/2006/main" xmlns:r="http://schemas.openxmlformats.org/officeDocument/2006/relationships" xmlns:p="http://schemas.openxmlformats.org/presentationml/2006/main">
+  <p:cSld>
+    <p:spTree>
+      <p:nvGrpSpPr>
+        <p:cNvPr id="1" name=""/>
+        <p:cNvGrpSpPr/>
+        <p:nvPr/>
+      </p:nvGrpSpPr>
+      <p:grpSpPr>
+        <a:xfrm>
+          <a:off x="0" y="0"/>
+          <a:ext cx="0" cy="0"/>
+          <a:chOff x="0" y="0"/>
+          <a:chExt cx="0" cy="0"/>
+        </a:xfrm>
+      </p:grpSpPr>
+      <p:sp>
+        <p:nvSpPr>
+          <p:cNvPr id="2" name="Title 1"/>
+          <p:cNvSpPr>
+            <a:spLocks noGrp="1"/>
+          </p:cNvSpPr>
+          <p:nvPr>
+            <p:ph type="ctrTitle"/>
+          </p:nvPr>
+        </p:nvSpPr>
+        <p:spPr>
+          <a:xfrm>
+            <a:off x="603504" y="4116227"/>
+            <a:ext cx="10782300" cy="1336524"/>
+          </a:xfrm>
+        </p:spPr>
+        <p:txBody>
+          <a:bodyPr/>
+          <a:lstStyle/>
+          <a:p>
+            <a:pPr algn="r"/>
+            <a:r>
               <a:rPr lang="en-US" sz="7200" dirty="0">
                 <a:latin typeface="Open sans" panose="020B0606030504020204" pitchFamily="34" charset="0"/>
                 <a:ea typeface="Open sans" panose="020B0606030504020204" pitchFamily="34" charset="0"/>
@@ -4860,7 +5378,7 @@
 </p:sld>
 </file>
 
-<file path=ppt/slides/slide12.xml><?xml version="1.0" encoding="utf-8"?>
+<file path=ppt/slides/slide15.xml><?xml version="1.0" encoding="utf-8"?>
 <p:sld xmlns:a="http://schemas.openxmlformats.org/drawingml/2006/main" xmlns:r="http://schemas.openxmlformats.org/officeDocument/2006/relationships" xmlns:p="http://schemas.openxmlformats.org/presentationml/2006/main">
   <p:cSld>
     <p:spTree>
@@ -4938,7 +5456,67 @@
 </p:sld>
 </file>
 
-<file path=ppt/slides/slide13.xml><?xml version="1.0" encoding="utf-8"?>
+<file path=ppt/slides/slide16.xml><?xml version="1.0" encoding="utf-8"?>
+<p:sld xmlns:a="http://schemas.openxmlformats.org/drawingml/2006/main" xmlns:r="http://schemas.openxmlformats.org/officeDocument/2006/relationships" xmlns:p="http://schemas.openxmlformats.org/presentationml/2006/main">
+  <p:cSld>
+    <p:spTree>
+      <p:nvGrpSpPr>
+        <p:cNvPr id="1" name=""/>
+        <p:cNvGrpSpPr/>
+        <p:nvPr/>
+      </p:nvGrpSpPr>
+      <p:grpSpPr>
+        <a:xfrm>
+          <a:off x="0" y="0"/>
+          <a:ext cx="0" cy="0"/>
+          <a:chOff x="0" y="0"/>
+          <a:chExt cx="0" cy="0"/>
+        </a:xfrm>
+      </p:grpSpPr>
+      <p:pic>
+        <p:nvPicPr>
+          <p:cNvPr id="4" name="Picture 3"/>
+          <p:cNvPicPr>
+            <a:picLocks noChangeAspect="1"/>
+          </p:cNvPicPr>
+          <p:nvPr/>
+        </p:nvPicPr>
+        <p:blipFill>
+          <a:blip r:embed="rId2">
+            <a:extLst>
+              <a:ext uri="{28A0092B-C50C-407E-A947-70E740481C1C}">
+                <a14:useLocalDpi xmlns:a14="http://schemas.microsoft.com/office/drawing/2010/main" val="0"/>
+              </a:ext>
+            </a:extLst>
+          </a:blip>
+          <a:stretch>
+            <a:fillRect/>
+          </a:stretch>
+        </p:blipFill>
+        <p:spPr>
+          <a:xfrm>
+            <a:off x="0" y="0"/>
+            <a:ext cx="12192000" cy="7032812"/>
+          </a:xfrm>
+          <a:prstGeom prst="rect">
+            <a:avLst/>
+          </a:prstGeom>
+        </p:spPr>
+      </p:pic>
+    </p:spTree>
+    <p:extLst>
+      <p:ext uri="{BB962C8B-B14F-4D97-AF65-F5344CB8AC3E}">
+        <p14:creationId xmlns:p14="http://schemas.microsoft.com/office/powerpoint/2010/main" val="3777818930"/>
+      </p:ext>
+    </p:extLst>
+  </p:cSld>
+  <p:clrMapOvr>
+    <a:masterClrMapping/>
+  </p:clrMapOvr>
+</p:sld>
+</file>
+
+<file path=ppt/slides/slide17.xml><?xml version="1.0" encoding="utf-8"?>
 <p:sld xmlns:a="http://schemas.openxmlformats.org/drawingml/2006/main" xmlns:r="http://schemas.openxmlformats.org/officeDocument/2006/relationships" xmlns:p="http://schemas.openxmlformats.org/presentationml/2006/main">
   <p:cSld>
     <p:spTree>
@@ -5425,6 +6003,154 @@
         </p:nvSpPr>
         <p:spPr>
           <a:xfrm>
+            <a:off x="603504" y="770467"/>
+            <a:ext cx="10782300" cy="1502086"/>
+          </a:xfrm>
+        </p:spPr>
+        <p:txBody>
+          <a:bodyPr/>
+          <a:lstStyle/>
+          <a:p>
+            <a:pPr algn="ctr"/>
+            <a:r>
+              <a:rPr lang="ro-RO" sz="9600" dirty="0">
+                <a:latin typeface="Open sans" panose="020B0606030504020204" pitchFamily="34" charset="0"/>
+                <a:ea typeface="Open sans" panose="020B0606030504020204" pitchFamily="34" charset="0"/>
+                <a:cs typeface="Open sans" panose="020B0606030504020204" pitchFamily="34" charset="0"/>
+              </a:rPr>
+              <a:t>Cloud Service</a:t>
+            </a:r>
+            <a:endParaRPr lang="en-US" dirty="0"/>
+          </a:p>
+        </p:txBody>
+      </p:sp>
+      <p:sp>
+        <p:nvSpPr>
+          <p:cNvPr id="3" name="Subtitle 2"/>
+          <p:cNvSpPr>
+            <a:spLocks noGrp="1"/>
+          </p:cNvSpPr>
+          <p:nvPr>
+            <p:ph type="subTitle" idx="1"/>
+          </p:nvPr>
+        </p:nvSpPr>
+        <p:spPr>
+          <a:xfrm>
+            <a:off x="1032569" y="2638930"/>
+            <a:ext cx="10353235" cy="2647191"/>
+          </a:xfrm>
+        </p:spPr>
+        <p:txBody>
+          <a:bodyPr>
+            <a:normAutofit/>
+          </a:bodyPr>
+          <a:lstStyle/>
+          <a:p>
+            <a:pPr>
+              <a:lnSpc>
+                <a:spcPct val="100000"/>
+              </a:lnSpc>
+              <a:spcBef>
+                <a:spcPts val="0"/>
+              </a:spcBef>
+            </a:pPr>
+            <a:r>
+              <a:rPr lang="ro-RO" b="1" dirty="0"/>
+              <a:t>Features:</a:t>
+            </a:r>
+          </a:p>
+          <a:p>
+            <a:pPr marL="457200" indent="-457200">
+              <a:lnSpc>
+                <a:spcPct val="100000"/>
+              </a:lnSpc>
+              <a:spcBef>
+                <a:spcPts val="0"/>
+              </a:spcBef>
+              <a:buFontTx/>
+              <a:buChar char="-"/>
+            </a:pPr>
+            <a:r>
+              <a:rPr lang="ro-RO" b="1" dirty="0"/>
+              <a:t>Register.</a:t>
+            </a:r>
+          </a:p>
+          <a:p>
+            <a:pPr marL="457200" indent="-457200">
+              <a:lnSpc>
+                <a:spcPct val="100000"/>
+              </a:lnSpc>
+              <a:spcBef>
+                <a:spcPts val="0"/>
+              </a:spcBef>
+              <a:buFontTx/>
+              <a:buChar char="-"/>
+            </a:pPr>
+            <a:r>
+              <a:rPr lang="ro-RO" b="1" dirty="0"/>
+              <a:t>Login.</a:t>
+            </a:r>
+          </a:p>
+          <a:p>
+            <a:pPr marL="457200" indent="-457200">
+              <a:lnSpc>
+                <a:spcPct val="100000"/>
+              </a:lnSpc>
+              <a:spcBef>
+                <a:spcPts val="0"/>
+              </a:spcBef>
+              <a:buFontTx/>
+              <a:buChar char="-"/>
+            </a:pPr>
+            <a:r>
+              <a:rPr lang="ro-RO" b="1" dirty="0"/>
+              <a:t>Upload files.</a:t>
+            </a:r>
+          </a:p>
+        </p:txBody>
+      </p:sp>
+    </p:spTree>
+    <p:extLst>
+      <p:ext uri="{BB962C8B-B14F-4D97-AF65-F5344CB8AC3E}">
+        <p14:creationId xmlns:p14="http://schemas.microsoft.com/office/powerpoint/2010/main" val="3880862633"/>
+      </p:ext>
+    </p:extLst>
+  </p:cSld>
+  <p:clrMapOvr>
+    <a:masterClrMapping/>
+  </p:clrMapOvr>
+</p:sld>
+</file>
+
+<file path=ppt/slides/slide8.xml><?xml version="1.0" encoding="utf-8"?>
+<p:sld xmlns:a="http://schemas.openxmlformats.org/drawingml/2006/main" xmlns:r="http://schemas.openxmlformats.org/officeDocument/2006/relationships" xmlns:p="http://schemas.openxmlformats.org/presentationml/2006/main">
+  <p:cSld>
+    <p:spTree>
+      <p:nvGrpSpPr>
+        <p:cNvPr id="1" name=""/>
+        <p:cNvGrpSpPr/>
+        <p:nvPr/>
+      </p:nvGrpSpPr>
+      <p:grpSpPr>
+        <a:xfrm>
+          <a:off x="0" y="0"/>
+          <a:ext cx="0" cy="0"/>
+          <a:chOff x="0" y="0"/>
+          <a:chExt cx="0" cy="0"/>
+        </a:xfrm>
+      </p:grpSpPr>
+      <p:sp>
+        <p:nvSpPr>
+          <p:cNvPr id="2" name="Title 1"/>
+          <p:cNvSpPr>
+            <a:spLocks noGrp="1"/>
+          </p:cNvSpPr>
+          <p:nvPr>
+            <p:ph type="ctrTitle"/>
+          </p:nvPr>
+        </p:nvSpPr>
+        <p:spPr>
+          <a:xfrm>
             <a:off x="603504" y="4116227"/>
             <a:ext cx="10782300" cy="1336524"/>
           </a:xfrm>
@@ -5587,7 +6313,7 @@
 </p:sld>
 </file>
 
-<file path=ppt/slides/slide8.xml><?xml version="1.0" encoding="utf-8"?>
+<file path=ppt/slides/slide9.xml><?xml version="1.0" encoding="utf-8"?>
 <p:sld xmlns:a="http://schemas.openxmlformats.org/drawingml/2006/main" xmlns:r="http://schemas.openxmlformats.org/officeDocument/2006/relationships" xmlns:p="http://schemas.openxmlformats.org/presentationml/2006/main">
   <p:cSld>
     <p:spTree>
@@ -5700,107 +6426,6 @@
     <p:extLst>
       <p:ext uri="{BB962C8B-B14F-4D97-AF65-F5344CB8AC3E}">
         <p14:creationId xmlns:p14="http://schemas.microsoft.com/office/powerpoint/2010/main" val="4028307011"/>
-      </p:ext>
-    </p:extLst>
-  </p:cSld>
-  <p:clrMapOvr>
-    <a:masterClrMapping/>
-  </p:clrMapOvr>
-</p:sld>
-</file>
-
-<file path=ppt/slides/slide9.xml><?xml version="1.0" encoding="utf-8"?>
-<p:sld xmlns:a="http://schemas.openxmlformats.org/drawingml/2006/main" xmlns:r="http://schemas.openxmlformats.org/officeDocument/2006/relationships" xmlns:p="http://schemas.openxmlformats.org/presentationml/2006/main">
-  <p:cSld>
-    <p:spTree>
-      <p:nvGrpSpPr>
-        <p:cNvPr id="1" name=""/>
-        <p:cNvGrpSpPr/>
-        <p:nvPr/>
-      </p:nvGrpSpPr>
-      <p:grpSpPr>
-        <a:xfrm>
-          <a:off x="0" y="0"/>
-          <a:ext cx="0" cy="0"/>
-          <a:chOff x="0" y="0"/>
-          <a:chExt cx="0" cy="0"/>
-        </a:xfrm>
-      </p:grpSpPr>
-      <p:sp>
-        <p:nvSpPr>
-          <p:cNvPr id="2" name="Title 1"/>
-          <p:cNvSpPr>
-            <a:spLocks noGrp="1"/>
-          </p:cNvSpPr>
-          <p:nvPr>
-            <p:ph type="ctrTitle"/>
-          </p:nvPr>
-        </p:nvSpPr>
-        <p:spPr>
-          <a:xfrm>
-            <a:off x="603504" y="4116227"/>
-            <a:ext cx="10782300" cy="1336524"/>
-          </a:xfrm>
-        </p:spPr>
-        <p:txBody>
-          <a:bodyPr/>
-          <a:lstStyle/>
-          <a:p>
-            <a:pPr algn="r"/>
-            <a:r>
-              <a:rPr lang="en-US" sz="7200" dirty="0">
-                <a:latin typeface="Open sans" panose="020B0606030504020204" pitchFamily="34" charset="0"/>
-                <a:ea typeface="Open sans" panose="020B0606030504020204" pitchFamily="34" charset="0"/>
-                <a:cs typeface="Open sans" panose="020B0606030504020204" pitchFamily="34" charset="0"/>
-              </a:rPr>
-              <a:t>XSS Vulnerability</a:t>
-            </a:r>
-            <a:endParaRPr lang="en-US" sz="6600" dirty="0"/>
-          </a:p>
-        </p:txBody>
-      </p:sp>
-      <p:sp>
-        <p:nvSpPr>
-          <p:cNvPr id="3" name="Subtitle 2"/>
-          <p:cNvSpPr>
-            <a:spLocks noGrp="1"/>
-          </p:cNvSpPr>
-          <p:nvPr>
-            <p:ph type="subTitle" idx="1"/>
-          </p:nvPr>
-        </p:nvSpPr>
-        <p:spPr>
-          <a:xfrm>
-            <a:off x="799447" y="2148114"/>
-            <a:ext cx="10353235" cy="1968113"/>
-          </a:xfrm>
-        </p:spPr>
-        <p:txBody>
-          <a:bodyPr>
-            <a:normAutofit/>
-          </a:bodyPr>
-          <a:lstStyle/>
-          <a:p>
-            <a:pPr>
-              <a:lnSpc>
-                <a:spcPct val="100000"/>
-              </a:lnSpc>
-              <a:spcBef>
-                <a:spcPts val="0"/>
-              </a:spcBef>
-            </a:pPr>
-            <a:r>
-              <a:rPr lang="en-US" dirty="0"/>
-              <a:t>Web Browser XSS Protection is not enabled, or is disabled by the configuration of the 'X-XSS-Protection' HTTP response header on the web server</a:t>
-            </a:r>
-            <a:endParaRPr lang="en-US" b="1" dirty="0"/>
-          </a:p>
-        </p:txBody>
-      </p:sp>
-    </p:spTree>
-    <p:extLst>
-      <p:ext uri="{BB962C8B-B14F-4D97-AF65-F5344CB8AC3E}">
-        <p14:creationId xmlns:p14="http://schemas.microsoft.com/office/powerpoint/2010/main" val="767117228"/>
       </p:ext>
     </p:extLst>
   </p:cSld>

</xml_diff>